<commit_message>
Mimor Modification of Presentation
</commit_message>
<xml_diff>
--- a/Blood Bank DB.pptx
+++ b/Blood Bank DB.pptx
@@ -8917,7 +8917,7 @@
           <a:p>
             <a:fld id="{51926A01-2A89-4F63-A08E-978E78919387}" type="datetimeFigureOut">
               <a:rPr lang="vi-VN" smtClean="0"/>
-              <a:t>10/07/2020</a:t>
+              <a:t>11/07/2020</a:t>
             </a:fld>
             <a:endParaRPr lang="vi-VN"/>
           </a:p>
@@ -9124,7 +9124,7 @@
           <a:p>
             <a:fld id="{51926A01-2A89-4F63-A08E-978E78919387}" type="datetimeFigureOut">
               <a:rPr lang="vi-VN" smtClean="0"/>
-              <a:t>10/07/2020</a:t>
+              <a:t>11/07/2020</a:t>
             </a:fld>
             <a:endParaRPr lang="vi-VN"/>
           </a:p>
@@ -9304,7 +9304,7 @@
           <a:p>
             <a:fld id="{51926A01-2A89-4F63-A08E-978E78919387}" type="datetimeFigureOut">
               <a:rPr lang="vi-VN" smtClean="0"/>
-              <a:t>10/07/2020</a:t>
+              <a:t>11/07/2020</a:t>
             </a:fld>
             <a:endParaRPr lang="vi-VN"/>
           </a:p>
@@ -10806,7 +10806,7 @@
           <a:p>
             <a:fld id="{51926A01-2A89-4F63-A08E-978E78919387}" type="datetimeFigureOut">
               <a:rPr lang="vi-VN" smtClean="0"/>
-              <a:t>10/07/2020</a:t>
+              <a:t>11/07/2020</a:t>
             </a:fld>
             <a:endParaRPr lang="vi-VN"/>
           </a:p>
@@ -12279,7 +12279,7 @@
           <a:p>
             <a:fld id="{51926A01-2A89-4F63-A08E-978E78919387}" type="datetimeFigureOut">
               <a:rPr lang="vi-VN" smtClean="0"/>
-              <a:t>10/07/2020</a:t>
+              <a:t>11/07/2020</a:t>
             </a:fld>
             <a:endParaRPr lang="vi-VN"/>
           </a:p>
@@ -13784,7 +13784,7 @@
           <a:p>
             <a:fld id="{51926A01-2A89-4F63-A08E-978E78919387}" type="datetimeFigureOut">
               <a:rPr lang="vi-VN" smtClean="0"/>
-              <a:t>10/07/2020</a:t>
+              <a:t>11/07/2020</a:t>
             </a:fld>
             <a:endParaRPr lang="vi-VN"/>
           </a:p>
@@ -15301,7 +15301,7 @@
           <a:p>
             <a:fld id="{51926A01-2A89-4F63-A08E-978E78919387}" type="datetimeFigureOut">
               <a:rPr lang="vi-VN" smtClean="0"/>
-              <a:t>10/07/2020</a:t>
+              <a:t>11/07/2020</a:t>
             </a:fld>
             <a:endParaRPr lang="vi-VN"/>
           </a:p>
@@ -16993,7 +16993,7 @@
           <a:p>
             <a:fld id="{51926A01-2A89-4F63-A08E-978E78919387}" type="datetimeFigureOut">
               <a:rPr lang="vi-VN" smtClean="0"/>
-              <a:t>10/07/2020</a:t>
+              <a:t>11/07/2020</a:t>
             </a:fld>
             <a:endParaRPr lang="vi-VN"/>
           </a:p>
@@ -18388,7 +18388,7 @@
           <a:p>
             <a:fld id="{51926A01-2A89-4F63-A08E-978E78919387}" type="datetimeFigureOut">
               <a:rPr lang="vi-VN" smtClean="0"/>
-              <a:t>10/07/2020</a:t>
+              <a:t>11/07/2020</a:t>
             </a:fld>
             <a:endParaRPr lang="vi-VN"/>
           </a:p>
@@ -18488,7 +18488,7 @@
           <a:p>
             <a:fld id="{51926A01-2A89-4F63-A08E-978E78919387}" type="datetimeFigureOut">
               <a:rPr lang="vi-VN" smtClean="0"/>
-              <a:t>10/07/2020</a:t>
+              <a:t>11/07/2020</a:t>
             </a:fld>
             <a:endParaRPr lang="vi-VN"/>
           </a:p>
@@ -20011,7 +20011,7 @@
           <a:p>
             <a:fld id="{51926A01-2A89-4F63-A08E-978E78919387}" type="datetimeFigureOut">
               <a:rPr lang="vi-VN" smtClean="0"/>
-              <a:t>10/07/2020</a:t>
+              <a:t>11/07/2020</a:t>
             </a:fld>
             <a:endParaRPr lang="vi-VN"/>
           </a:p>
@@ -20181,7 +20181,7 @@
           <a:p>
             <a:fld id="{51926A01-2A89-4F63-A08E-978E78919387}" type="datetimeFigureOut">
               <a:rPr lang="vi-VN" smtClean="0"/>
-              <a:t>10/07/2020</a:t>
+              <a:t>11/07/2020</a:t>
             </a:fld>
             <a:endParaRPr lang="vi-VN"/>
           </a:p>
@@ -21714,7 +21714,7 @@
           <a:p>
             <a:fld id="{51926A01-2A89-4F63-A08E-978E78919387}" type="datetimeFigureOut">
               <a:rPr lang="vi-VN" smtClean="0"/>
-              <a:t>10/07/2020</a:t>
+              <a:t>11/07/2020</a:t>
             </a:fld>
             <a:endParaRPr lang="vi-VN"/>
           </a:p>
@@ -23166,7 +23166,7 @@
           <a:p>
             <a:fld id="{51926A01-2A89-4F63-A08E-978E78919387}" type="datetimeFigureOut">
               <a:rPr lang="vi-VN" smtClean="0"/>
-              <a:t>10/07/2020</a:t>
+              <a:t>11/07/2020</a:t>
             </a:fld>
             <a:endParaRPr lang="vi-VN"/>
           </a:p>
@@ -24647,7 +24647,7 @@
           <a:p>
             <a:fld id="{51926A01-2A89-4F63-A08E-978E78919387}" type="datetimeFigureOut">
               <a:rPr lang="vi-VN" smtClean="0"/>
-              <a:t>10/07/2020</a:t>
+              <a:t>11/07/2020</a:t>
             </a:fld>
             <a:endParaRPr lang="vi-VN"/>
           </a:p>
@@ -33555,7 +33555,7 @@
           <a:p>
             <a:fld id="{51926A01-2A89-4F63-A08E-978E78919387}" type="datetimeFigureOut">
               <a:rPr lang="vi-VN" smtClean="0"/>
-              <a:t>10/07/2020</a:t>
+              <a:t>11/07/2020</a:t>
             </a:fld>
             <a:endParaRPr lang="vi-VN"/>
           </a:p>
@@ -33829,7 +33829,7 @@
           <a:p>
             <a:fld id="{51926A01-2A89-4F63-A08E-978E78919387}" type="datetimeFigureOut">
               <a:rPr lang="vi-VN" smtClean="0"/>
-              <a:t>10/07/2020</a:t>
+              <a:t>11/07/2020</a:t>
             </a:fld>
             <a:endParaRPr lang="vi-VN"/>
           </a:p>
@@ -34227,7 +34227,7 @@
           <a:p>
             <a:fld id="{51926A01-2A89-4F63-A08E-978E78919387}" type="datetimeFigureOut">
               <a:rPr lang="vi-VN" smtClean="0"/>
-              <a:t>10/07/2020</a:t>
+              <a:t>11/07/2020</a:t>
             </a:fld>
             <a:endParaRPr lang="vi-VN"/>
           </a:p>
@@ -34345,7 +34345,7 @@
           <a:p>
             <a:fld id="{51926A01-2A89-4F63-A08E-978E78919387}" type="datetimeFigureOut">
               <a:rPr lang="vi-VN" smtClean="0"/>
-              <a:t>10/07/2020</a:t>
+              <a:t>11/07/2020</a:t>
             </a:fld>
             <a:endParaRPr lang="vi-VN"/>
           </a:p>
@@ -34440,7 +34440,7 @@
           <a:p>
             <a:fld id="{51926A01-2A89-4F63-A08E-978E78919387}" type="datetimeFigureOut">
               <a:rPr lang="vi-VN" smtClean="0"/>
-              <a:t>10/07/2020</a:t>
+              <a:t>11/07/2020</a:t>
             </a:fld>
             <a:endParaRPr lang="vi-VN"/>
           </a:p>
@@ -34730,7 +34730,7 @@
           <a:p>
             <a:fld id="{51926A01-2A89-4F63-A08E-978E78919387}" type="datetimeFigureOut">
               <a:rPr lang="vi-VN" smtClean="0"/>
-              <a:t>10/07/2020</a:t>
+              <a:t>11/07/2020</a:t>
             </a:fld>
             <a:endParaRPr lang="vi-VN"/>
           </a:p>
@@ -35010,7 +35010,7 @@
           <a:p>
             <a:fld id="{51926A01-2A89-4F63-A08E-978E78919387}" type="datetimeFigureOut">
               <a:rPr lang="vi-VN" smtClean="0"/>
-              <a:t>10/07/2020</a:t>
+              <a:t>11/07/2020</a:t>
             </a:fld>
             <a:endParaRPr lang="vi-VN"/>
           </a:p>
@@ -35260,7 +35260,7 @@
           <a:p>
             <a:fld id="{51926A01-2A89-4F63-A08E-978E78919387}" type="datetimeFigureOut">
               <a:rPr lang="vi-VN" smtClean="0"/>
-              <a:t>10/07/2020</a:t>
+              <a:t>11/07/2020</a:t>
             </a:fld>
             <a:endParaRPr lang="vi-VN"/>
           </a:p>
@@ -35896,7 +35896,7 @@
           <a:p>
             <a:fld id="{51926A01-2A89-4F63-A08E-978E78919387}" type="datetimeFigureOut">
               <a:rPr lang="vi-VN" smtClean="0"/>
-              <a:t>10/07/2020</a:t>
+              <a:t>11/07/2020</a:t>
             </a:fld>
             <a:endParaRPr lang="vi-VN"/>
           </a:p>
@@ -36460,20 +36460,16 @@
           <a:p>
             <a:r>
               <a:rPr lang="en-US" i="1" u="sng" dirty="0"/>
-              <a:t>Group</a:t>
+              <a:t>Group </a:t>
             </a:r>
             <a:r>
-              <a:rPr lang="en-US" i="1" dirty="0"/>
-              <a:t> </a:t>
-            </a:r>
-            <a:r>
-              <a:rPr lang="en-US" dirty="0">
+              <a:rPr lang="en-US" u="sng" dirty="0">
                 <a:sym typeface="Wingdings" panose="05000000000000000000" pitchFamily="2" charset="2"/>
               </a:rPr>
               <a:t></a:t>
             </a:r>
             <a:r>
-              <a:rPr lang="en-US" i="1" dirty="0"/>
+              <a:rPr lang="en-US" i="1" u="sng" dirty="0"/>
               <a:t>:</a:t>
             </a:r>
           </a:p>
@@ -36918,13 +36914,13 @@
   <p:clrMapOvr>
     <a:masterClrMapping/>
   </p:clrMapOvr>
-  <mc:AlternateContent xmlns:mc="http://schemas.openxmlformats.org/markup-compatibility/2006">
-    <mc:Choice xmlns:p159="http://schemas.microsoft.com/office/powerpoint/2015/09/main" Requires="p159">
+  <mc:AlternateContent xmlns:mc="http://schemas.openxmlformats.org/markup-compatibility/2006" xmlns:p159="http://schemas.microsoft.com/office/powerpoint/2015/09/main">
+    <mc:Choice Requires="p159">
       <p:transition xmlns:p14="http://schemas.microsoft.com/office/powerpoint/2010/main" spd="slow" p14:dur="2000">
         <p159:morph option="byObject"/>
       </p:transition>
     </mc:Choice>
-    <mc:Fallback>
+    <mc:Fallback xmlns="">
       <p:transition spd="slow">
         <p:fade/>
       </p:transition>
@@ -37552,13 +37548,13 @@
   <p:clrMapOvr>
     <a:masterClrMapping/>
   </p:clrMapOvr>
-  <mc:AlternateContent xmlns:mc="http://schemas.openxmlformats.org/markup-compatibility/2006">
-    <mc:Choice xmlns:p159="http://schemas.microsoft.com/office/powerpoint/2015/09/main" Requires="p159">
+  <mc:AlternateContent xmlns:mc="http://schemas.openxmlformats.org/markup-compatibility/2006" xmlns:p159="http://schemas.microsoft.com/office/powerpoint/2015/09/main">
+    <mc:Choice Requires="p159">
       <p:transition xmlns:p14="http://schemas.microsoft.com/office/powerpoint/2010/main" spd="slow" p14:dur="2000">
         <p159:morph option="byObject"/>
       </p:transition>
     </mc:Choice>
-    <mc:Fallback>
+    <mc:Fallback xmlns="">
       <p:transition spd="slow">
         <p:fade/>
       </p:transition>
@@ -38023,13 +38019,13 @@
   <p:clrMapOvr>
     <a:masterClrMapping/>
   </p:clrMapOvr>
-  <mc:AlternateContent xmlns:mc="http://schemas.openxmlformats.org/markup-compatibility/2006">
-    <mc:Choice xmlns:p159="http://schemas.microsoft.com/office/powerpoint/2015/09/main" Requires="p159">
+  <mc:AlternateContent xmlns:mc="http://schemas.openxmlformats.org/markup-compatibility/2006" xmlns:p159="http://schemas.microsoft.com/office/powerpoint/2015/09/main">
+    <mc:Choice Requires="p159">
       <p:transition xmlns:p14="http://schemas.microsoft.com/office/powerpoint/2010/main" spd="slow" p14:dur="2000">
         <p159:morph option="byObject"/>
       </p:transition>
     </mc:Choice>
-    <mc:Fallback>
+    <mc:Fallback xmlns="">
       <p:transition spd="slow">
         <p:fade/>
       </p:transition>
@@ -38913,13 +38909,13 @@
   <p:clrMapOvr>
     <a:masterClrMapping/>
   </p:clrMapOvr>
-  <mc:AlternateContent xmlns:mc="http://schemas.openxmlformats.org/markup-compatibility/2006">
-    <mc:Choice xmlns:p159="http://schemas.microsoft.com/office/powerpoint/2015/09/main" Requires="p159">
+  <mc:AlternateContent xmlns:mc="http://schemas.openxmlformats.org/markup-compatibility/2006" xmlns:p159="http://schemas.microsoft.com/office/powerpoint/2015/09/main">
+    <mc:Choice Requires="p159">
       <p:transition xmlns:p14="http://schemas.microsoft.com/office/powerpoint/2010/main" spd="slow" p14:dur="2000">
         <p159:morph option="byObject"/>
       </p:transition>
     </mc:Choice>
-    <mc:Fallback>
+    <mc:Fallback xmlns="">
       <p:transition spd="slow">
         <p:fade/>
       </p:transition>
@@ -39194,13 +39190,13 @@
   <p:clrMapOvr>
     <a:masterClrMapping/>
   </p:clrMapOvr>
-  <mc:AlternateContent xmlns:mc="http://schemas.openxmlformats.org/markup-compatibility/2006">
-    <mc:Choice xmlns:p159="http://schemas.microsoft.com/office/powerpoint/2015/09/main" Requires="p159">
+  <mc:AlternateContent xmlns:mc="http://schemas.openxmlformats.org/markup-compatibility/2006" xmlns:p159="http://schemas.microsoft.com/office/powerpoint/2015/09/main">
+    <mc:Choice Requires="p159">
       <p:transition xmlns:p14="http://schemas.microsoft.com/office/powerpoint/2010/main" spd="slow" p14:dur="2000">
         <p159:morph option="byObject"/>
       </p:transition>
     </mc:Choice>
-    <mc:Fallback>
+    <mc:Fallback xmlns="">
       <p:transition spd="slow">
         <p:fade/>
       </p:transition>
@@ -40487,13 +40483,13 @@
   <p:clrMapOvr>
     <a:masterClrMapping/>
   </p:clrMapOvr>
-  <mc:AlternateContent xmlns:mc="http://schemas.openxmlformats.org/markup-compatibility/2006">
-    <mc:Choice xmlns:p159="http://schemas.microsoft.com/office/powerpoint/2015/09/main" Requires="p159">
+  <mc:AlternateContent xmlns:mc="http://schemas.openxmlformats.org/markup-compatibility/2006" xmlns:p159="http://schemas.microsoft.com/office/powerpoint/2015/09/main">
+    <mc:Choice Requires="p159">
       <p:transition xmlns:p14="http://schemas.microsoft.com/office/powerpoint/2010/main" spd="slow" p14:dur="2000">
         <p159:morph option="byObject"/>
       </p:transition>
     </mc:Choice>
-    <mc:Fallback>
+    <mc:Fallback xmlns="">
       <p:transition spd="slow">
         <p:fade/>
       </p:transition>
@@ -40846,13 +40842,13 @@
   <p:clrMapOvr>
     <a:masterClrMapping/>
   </p:clrMapOvr>
-  <mc:AlternateContent xmlns:mc="http://schemas.openxmlformats.org/markup-compatibility/2006">
-    <mc:Choice xmlns:p159="http://schemas.microsoft.com/office/powerpoint/2015/09/main" Requires="p159">
+  <mc:AlternateContent xmlns:mc="http://schemas.openxmlformats.org/markup-compatibility/2006" xmlns:p159="http://schemas.microsoft.com/office/powerpoint/2015/09/main">
+    <mc:Choice Requires="p159">
       <p:transition xmlns:p14="http://schemas.microsoft.com/office/powerpoint/2010/main" spd="slow" p14:dur="2000">
         <p159:morph option="byObject"/>
       </p:transition>
     </mc:Choice>
-    <mc:Fallback>
+    <mc:Fallback xmlns="">
       <p:transition spd="slow">
         <p:fade/>
       </p:transition>

</xml_diff>

<commit_message>
Final Modification: Notification when unsuccessfully requested and presentation
</commit_message>
<xml_diff>
--- a/Blood Bank DB.pptx
+++ b/Blood Bank DB.pptx
@@ -8917,7 +8917,7 @@
           <a:p>
             <a:fld id="{51926A01-2A89-4F63-A08E-978E78919387}" type="datetimeFigureOut">
               <a:rPr lang="vi-VN" smtClean="0"/>
-              <a:t>10/07/2020</a:t>
+              <a:t>11/07/2020</a:t>
             </a:fld>
             <a:endParaRPr lang="vi-VN"/>
           </a:p>
@@ -9124,7 +9124,7 @@
           <a:p>
             <a:fld id="{51926A01-2A89-4F63-A08E-978E78919387}" type="datetimeFigureOut">
               <a:rPr lang="vi-VN" smtClean="0"/>
-              <a:t>10/07/2020</a:t>
+              <a:t>11/07/2020</a:t>
             </a:fld>
             <a:endParaRPr lang="vi-VN"/>
           </a:p>
@@ -9304,7 +9304,7 @@
           <a:p>
             <a:fld id="{51926A01-2A89-4F63-A08E-978E78919387}" type="datetimeFigureOut">
               <a:rPr lang="vi-VN" smtClean="0"/>
-              <a:t>10/07/2020</a:t>
+              <a:t>11/07/2020</a:t>
             </a:fld>
             <a:endParaRPr lang="vi-VN"/>
           </a:p>
@@ -10806,7 +10806,7 @@
           <a:p>
             <a:fld id="{51926A01-2A89-4F63-A08E-978E78919387}" type="datetimeFigureOut">
               <a:rPr lang="vi-VN" smtClean="0"/>
-              <a:t>10/07/2020</a:t>
+              <a:t>11/07/2020</a:t>
             </a:fld>
             <a:endParaRPr lang="vi-VN"/>
           </a:p>
@@ -12279,7 +12279,7 @@
           <a:p>
             <a:fld id="{51926A01-2A89-4F63-A08E-978E78919387}" type="datetimeFigureOut">
               <a:rPr lang="vi-VN" smtClean="0"/>
-              <a:t>10/07/2020</a:t>
+              <a:t>11/07/2020</a:t>
             </a:fld>
             <a:endParaRPr lang="vi-VN"/>
           </a:p>
@@ -13784,7 +13784,7 @@
           <a:p>
             <a:fld id="{51926A01-2A89-4F63-A08E-978E78919387}" type="datetimeFigureOut">
               <a:rPr lang="vi-VN" smtClean="0"/>
-              <a:t>10/07/2020</a:t>
+              <a:t>11/07/2020</a:t>
             </a:fld>
             <a:endParaRPr lang="vi-VN"/>
           </a:p>
@@ -15301,7 +15301,7 @@
           <a:p>
             <a:fld id="{51926A01-2A89-4F63-A08E-978E78919387}" type="datetimeFigureOut">
               <a:rPr lang="vi-VN" smtClean="0"/>
-              <a:t>10/07/2020</a:t>
+              <a:t>11/07/2020</a:t>
             </a:fld>
             <a:endParaRPr lang="vi-VN"/>
           </a:p>
@@ -16993,7 +16993,7 @@
           <a:p>
             <a:fld id="{51926A01-2A89-4F63-A08E-978E78919387}" type="datetimeFigureOut">
               <a:rPr lang="vi-VN" smtClean="0"/>
-              <a:t>10/07/2020</a:t>
+              <a:t>11/07/2020</a:t>
             </a:fld>
             <a:endParaRPr lang="vi-VN"/>
           </a:p>
@@ -18388,7 +18388,7 @@
           <a:p>
             <a:fld id="{51926A01-2A89-4F63-A08E-978E78919387}" type="datetimeFigureOut">
               <a:rPr lang="vi-VN" smtClean="0"/>
-              <a:t>10/07/2020</a:t>
+              <a:t>11/07/2020</a:t>
             </a:fld>
             <a:endParaRPr lang="vi-VN"/>
           </a:p>
@@ -18488,7 +18488,7 @@
           <a:p>
             <a:fld id="{51926A01-2A89-4F63-A08E-978E78919387}" type="datetimeFigureOut">
               <a:rPr lang="vi-VN" smtClean="0"/>
-              <a:t>10/07/2020</a:t>
+              <a:t>11/07/2020</a:t>
             </a:fld>
             <a:endParaRPr lang="vi-VN"/>
           </a:p>
@@ -20011,7 +20011,7 @@
           <a:p>
             <a:fld id="{51926A01-2A89-4F63-A08E-978E78919387}" type="datetimeFigureOut">
               <a:rPr lang="vi-VN" smtClean="0"/>
-              <a:t>10/07/2020</a:t>
+              <a:t>11/07/2020</a:t>
             </a:fld>
             <a:endParaRPr lang="vi-VN"/>
           </a:p>
@@ -20181,7 +20181,7 @@
           <a:p>
             <a:fld id="{51926A01-2A89-4F63-A08E-978E78919387}" type="datetimeFigureOut">
               <a:rPr lang="vi-VN" smtClean="0"/>
-              <a:t>10/07/2020</a:t>
+              <a:t>11/07/2020</a:t>
             </a:fld>
             <a:endParaRPr lang="vi-VN"/>
           </a:p>
@@ -21714,7 +21714,7 @@
           <a:p>
             <a:fld id="{51926A01-2A89-4F63-A08E-978E78919387}" type="datetimeFigureOut">
               <a:rPr lang="vi-VN" smtClean="0"/>
-              <a:t>10/07/2020</a:t>
+              <a:t>11/07/2020</a:t>
             </a:fld>
             <a:endParaRPr lang="vi-VN"/>
           </a:p>
@@ -23166,7 +23166,7 @@
           <a:p>
             <a:fld id="{51926A01-2A89-4F63-A08E-978E78919387}" type="datetimeFigureOut">
               <a:rPr lang="vi-VN" smtClean="0"/>
-              <a:t>10/07/2020</a:t>
+              <a:t>11/07/2020</a:t>
             </a:fld>
             <a:endParaRPr lang="vi-VN"/>
           </a:p>
@@ -24647,7 +24647,7 @@
           <a:p>
             <a:fld id="{51926A01-2A89-4F63-A08E-978E78919387}" type="datetimeFigureOut">
               <a:rPr lang="vi-VN" smtClean="0"/>
-              <a:t>10/07/2020</a:t>
+              <a:t>11/07/2020</a:t>
             </a:fld>
             <a:endParaRPr lang="vi-VN"/>
           </a:p>
@@ -33555,7 +33555,7 @@
           <a:p>
             <a:fld id="{51926A01-2A89-4F63-A08E-978E78919387}" type="datetimeFigureOut">
               <a:rPr lang="vi-VN" smtClean="0"/>
-              <a:t>10/07/2020</a:t>
+              <a:t>11/07/2020</a:t>
             </a:fld>
             <a:endParaRPr lang="vi-VN"/>
           </a:p>
@@ -33829,7 +33829,7 @@
           <a:p>
             <a:fld id="{51926A01-2A89-4F63-A08E-978E78919387}" type="datetimeFigureOut">
               <a:rPr lang="vi-VN" smtClean="0"/>
-              <a:t>10/07/2020</a:t>
+              <a:t>11/07/2020</a:t>
             </a:fld>
             <a:endParaRPr lang="vi-VN"/>
           </a:p>
@@ -34227,7 +34227,7 @@
           <a:p>
             <a:fld id="{51926A01-2A89-4F63-A08E-978E78919387}" type="datetimeFigureOut">
               <a:rPr lang="vi-VN" smtClean="0"/>
-              <a:t>10/07/2020</a:t>
+              <a:t>11/07/2020</a:t>
             </a:fld>
             <a:endParaRPr lang="vi-VN"/>
           </a:p>
@@ -34345,7 +34345,7 @@
           <a:p>
             <a:fld id="{51926A01-2A89-4F63-A08E-978E78919387}" type="datetimeFigureOut">
               <a:rPr lang="vi-VN" smtClean="0"/>
-              <a:t>10/07/2020</a:t>
+              <a:t>11/07/2020</a:t>
             </a:fld>
             <a:endParaRPr lang="vi-VN"/>
           </a:p>
@@ -34440,7 +34440,7 @@
           <a:p>
             <a:fld id="{51926A01-2A89-4F63-A08E-978E78919387}" type="datetimeFigureOut">
               <a:rPr lang="vi-VN" smtClean="0"/>
-              <a:t>10/07/2020</a:t>
+              <a:t>11/07/2020</a:t>
             </a:fld>
             <a:endParaRPr lang="vi-VN"/>
           </a:p>
@@ -34730,7 +34730,7 @@
           <a:p>
             <a:fld id="{51926A01-2A89-4F63-A08E-978E78919387}" type="datetimeFigureOut">
               <a:rPr lang="vi-VN" smtClean="0"/>
-              <a:t>10/07/2020</a:t>
+              <a:t>11/07/2020</a:t>
             </a:fld>
             <a:endParaRPr lang="vi-VN"/>
           </a:p>
@@ -35010,7 +35010,7 @@
           <a:p>
             <a:fld id="{51926A01-2A89-4F63-A08E-978E78919387}" type="datetimeFigureOut">
               <a:rPr lang="vi-VN" smtClean="0"/>
-              <a:t>10/07/2020</a:t>
+              <a:t>11/07/2020</a:t>
             </a:fld>
             <a:endParaRPr lang="vi-VN"/>
           </a:p>
@@ -35260,7 +35260,7 @@
           <a:p>
             <a:fld id="{51926A01-2A89-4F63-A08E-978E78919387}" type="datetimeFigureOut">
               <a:rPr lang="vi-VN" smtClean="0"/>
-              <a:t>10/07/2020</a:t>
+              <a:t>11/07/2020</a:t>
             </a:fld>
             <a:endParaRPr lang="vi-VN"/>
           </a:p>
@@ -35896,7 +35896,7 @@
           <a:p>
             <a:fld id="{51926A01-2A89-4F63-A08E-978E78919387}" type="datetimeFigureOut">
               <a:rPr lang="vi-VN" smtClean="0"/>
-              <a:t>10/07/2020</a:t>
+              <a:t>11/07/2020</a:t>
             </a:fld>
             <a:endParaRPr lang="vi-VN"/>
           </a:p>
@@ -36808,7 +36808,7 @@
                   <a:schemeClr val="bg1"/>
                 </a:solidFill>
               </a:rPr>
-              <a:t>If the request is valid, it will return a “request-success” page. Else, there would be an error page shown.</a:t>
+              <a:t>If the request is valid, it will return a “request-success” page. Else, there would be a notification page shown.</a:t>
             </a:r>
             <a:endParaRPr lang="vi-VN" dirty="0">
               <a:solidFill>
@@ -36870,7 +36870,7 @@
         </p:blipFill>
         <p:spPr>
           <a:xfrm>
-            <a:off x="4952651" y="1372512"/>
+            <a:off x="5032550" y="1328124"/>
             <a:ext cx="3630966" cy="4416441"/>
           </a:xfrm>
           <a:prstGeom prst="rect">
@@ -36880,10 +36880,10 @@
       </p:pic>
       <p:pic>
         <p:nvPicPr>
-          <p:cNvPr id="7" name="Picture 6">
+          <p:cNvPr id="4" name="Picture 3">
             <a:extLst>
               <a:ext uri="{FF2B5EF4-FFF2-40B4-BE49-F238E27FC236}">
-                <a16:creationId xmlns:a16="http://schemas.microsoft.com/office/drawing/2014/main" id="{A480E4BD-84A5-4372-B32C-B1927D6CF68B}"/>
+                <a16:creationId xmlns:a16="http://schemas.microsoft.com/office/drawing/2014/main" id="{3E6B6014-FCDE-47F4-BA79-2AC4E1A71F00}"/>
               </a:ext>
             </a:extLst>
           </p:cNvPr>
@@ -36900,8 +36900,8 @@
         </p:blipFill>
         <p:spPr>
           <a:xfrm>
-            <a:off x="8583617" y="1372512"/>
-            <a:ext cx="3138264" cy="4449589"/>
+            <a:off x="8663516" y="1378258"/>
+            <a:ext cx="2859700" cy="4361642"/>
           </a:xfrm>
           <a:prstGeom prst="rect">
             <a:avLst/>
@@ -36918,13 +36918,13 @@
   <p:clrMapOvr>
     <a:masterClrMapping/>
   </p:clrMapOvr>
-  <mc:AlternateContent xmlns:mc="http://schemas.openxmlformats.org/markup-compatibility/2006">
-    <mc:Choice xmlns:p159="http://schemas.microsoft.com/office/powerpoint/2015/09/main" Requires="p159">
+  <mc:AlternateContent xmlns:mc="http://schemas.openxmlformats.org/markup-compatibility/2006" xmlns:p159="http://schemas.microsoft.com/office/powerpoint/2015/09/main">
+    <mc:Choice Requires="p159">
       <p:transition xmlns:p14="http://schemas.microsoft.com/office/powerpoint/2010/main" spd="slow" p14:dur="2000">
         <p159:morph option="byObject"/>
       </p:transition>
     </mc:Choice>
-    <mc:Fallback>
+    <mc:Fallback xmlns="">
       <p:transition spd="slow">
         <p:fade/>
       </p:transition>
@@ -37185,71 +37185,6 @@
                                         <p:cTn id="14" dur="1000"/>
                                         <p:tgtEl>
                                           <p:spTgt spid="5"/>
-                                        </p:tgtEl>
-                                      </p:cBhvr>
-                                    </p:animEffect>
-                                  </p:childTnLst>
-                                </p:cTn>
-                              </p:par>
-                              <p:par>
-                                <p:cTn id="15" presetID="52" presetClass="entr" presetSubtype="0" fill="hold" nodeType="withEffect">
-                                  <p:stCondLst>
-                                    <p:cond delay="0"/>
-                                  </p:stCondLst>
-                                  <p:childTnLst>
-                                    <p:set>
-                                      <p:cBhvr>
-                                        <p:cTn id="16" dur="1" fill="hold">
-                                          <p:stCondLst>
-                                            <p:cond delay="0"/>
-                                          </p:stCondLst>
-                                        </p:cTn>
-                                        <p:tgtEl>
-                                          <p:spTgt spid="7"/>
-                                        </p:tgtEl>
-                                        <p:attrNameLst>
-                                          <p:attrName>style.visibility</p:attrName>
-                                        </p:attrNameLst>
-                                      </p:cBhvr>
-                                      <p:to>
-                                        <p:strVal val="visible"/>
-                                      </p:to>
-                                    </p:set>
-                                    <p:animScale>
-                                      <p:cBhvr>
-                                        <p:cTn id="17" dur="1000" decel="50000" fill="hold">
-                                          <p:stCondLst>
-                                            <p:cond delay="0"/>
-                                          </p:stCondLst>
-                                        </p:cTn>
-                                        <p:tgtEl>
-                                          <p:spTgt spid="7"/>
-                                        </p:tgtEl>
-                                      </p:cBhvr>
-                                      <p:from x="250000" y="250000"/>
-                                      <p:to x="100000" y="100000"/>
-                                    </p:animScale>
-                                    <p:animMotion origin="layout" path="M -0.46736 0.92887  C -0.37517 0.88508  -0.02552 0.75279  0.0908 0.66613  C  0.20747 0.57948  0.21649 0.50394  0.23177 0.40825  C 0.24705 0.31256  0.22118 0.15964   0.18264 0.09152  C 0.1441 0.02341  0.03802 0.0  0.0 0.0  " pathEditMode="relative" ptsTypes="">
-                                      <p:cBhvr>
-                                        <p:cTn id="18" dur="1000" decel="50000" fill="hold">
-                                          <p:stCondLst>
-                                            <p:cond delay="0"/>
-                                          </p:stCondLst>
-                                        </p:cTn>
-                                        <p:tgtEl>
-                                          <p:spTgt spid="7"/>
-                                        </p:tgtEl>
-                                        <p:attrNameLst>
-                                          <p:attrName>ppt_x</p:attrName>
-                                          <p:attrName>ppt_y</p:attrName>
-                                        </p:attrNameLst>
-                                      </p:cBhvr>
-                                    </p:animMotion>
-                                    <p:animEffect transition="in" filter="fade">
-                                      <p:cBhvr>
-                                        <p:cTn id="19" dur="1000"/>
-                                        <p:tgtEl>
-                                          <p:spTgt spid="7"/>
                                         </p:tgtEl>
                                       </p:cBhvr>
                                     </p:animEffect>
@@ -37552,13 +37487,13 @@
   <p:clrMapOvr>
     <a:masterClrMapping/>
   </p:clrMapOvr>
-  <mc:AlternateContent xmlns:mc="http://schemas.openxmlformats.org/markup-compatibility/2006">
-    <mc:Choice xmlns:p159="http://schemas.microsoft.com/office/powerpoint/2015/09/main" Requires="p159">
+  <mc:AlternateContent xmlns:mc="http://schemas.openxmlformats.org/markup-compatibility/2006" xmlns:p159="http://schemas.microsoft.com/office/powerpoint/2015/09/main">
+    <mc:Choice Requires="p159">
       <p:transition xmlns:p14="http://schemas.microsoft.com/office/powerpoint/2010/main" spd="slow" p14:dur="2000">
         <p159:morph option="byObject"/>
       </p:transition>
     </mc:Choice>
-    <mc:Fallback>
+    <mc:Fallback xmlns="">
       <p:transition spd="slow">
         <p:fade/>
       </p:transition>
@@ -38023,13 +37958,13 @@
   <p:clrMapOvr>
     <a:masterClrMapping/>
   </p:clrMapOvr>
-  <mc:AlternateContent xmlns:mc="http://schemas.openxmlformats.org/markup-compatibility/2006">
-    <mc:Choice xmlns:p159="http://schemas.microsoft.com/office/powerpoint/2015/09/main" Requires="p159">
+  <mc:AlternateContent xmlns:mc="http://schemas.openxmlformats.org/markup-compatibility/2006" xmlns:p159="http://schemas.microsoft.com/office/powerpoint/2015/09/main">
+    <mc:Choice Requires="p159">
       <p:transition xmlns:p14="http://schemas.microsoft.com/office/powerpoint/2010/main" spd="slow" p14:dur="2000">
         <p159:morph option="byObject"/>
       </p:transition>
     </mc:Choice>
-    <mc:Fallback>
+    <mc:Fallback xmlns="">
       <p:transition spd="slow">
         <p:fade/>
       </p:transition>
@@ -38913,13 +38848,13 @@
   <p:clrMapOvr>
     <a:masterClrMapping/>
   </p:clrMapOvr>
-  <mc:AlternateContent xmlns:mc="http://schemas.openxmlformats.org/markup-compatibility/2006">
-    <mc:Choice xmlns:p159="http://schemas.microsoft.com/office/powerpoint/2015/09/main" Requires="p159">
+  <mc:AlternateContent xmlns:mc="http://schemas.openxmlformats.org/markup-compatibility/2006" xmlns:p159="http://schemas.microsoft.com/office/powerpoint/2015/09/main">
+    <mc:Choice Requires="p159">
       <p:transition xmlns:p14="http://schemas.microsoft.com/office/powerpoint/2010/main" spd="slow" p14:dur="2000">
         <p159:morph option="byObject"/>
       </p:transition>
     </mc:Choice>
-    <mc:Fallback>
+    <mc:Fallback xmlns="">
       <p:transition spd="slow">
         <p:fade/>
       </p:transition>
@@ -39194,13 +39129,13 @@
   <p:clrMapOvr>
     <a:masterClrMapping/>
   </p:clrMapOvr>
-  <mc:AlternateContent xmlns:mc="http://schemas.openxmlformats.org/markup-compatibility/2006">
-    <mc:Choice xmlns:p159="http://schemas.microsoft.com/office/powerpoint/2015/09/main" Requires="p159">
+  <mc:AlternateContent xmlns:mc="http://schemas.openxmlformats.org/markup-compatibility/2006" xmlns:p159="http://schemas.microsoft.com/office/powerpoint/2015/09/main">
+    <mc:Choice Requires="p159">
       <p:transition xmlns:p14="http://schemas.microsoft.com/office/powerpoint/2010/main" spd="slow" p14:dur="2000">
         <p159:morph option="byObject"/>
       </p:transition>
     </mc:Choice>
-    <mc:Fallback>
+    <mc:Fallback xmlns="">
       <p:transition spd="slow">
         <p:fade/>
       </p:transition>
@@ -40487,13 +40422,13 @@
   <p:clrMapOvr>
     <a:masterClrMapping/>
   </p:clrMapOvr>
-  <mc:AlternateContent xmlns:mc="http://schemas.openxmlformats.org/markup-compatibility/2006">
-    <mc:Choice xmlns:p159="http://schemas.microsoft.com/office/powerpoint/2015/09/main" Requires="p159">
+  <mc:AlternateContent xmlns:mc="http://schemas.openxmlformats.org/markup-compatibility/2006" xmlns:p159="http://schemas.microsoft.com/office/powerpoint/2015/09/main">
+    <mc:Choice Requires="p159">
       <p:transition xmlns:p14="http://schemas.microsoft.com/office/powerpoint/2010/main" spd="slow" p14:dur="2000">
         <p159:morph option="byObject"/>
       </p:transition>
     </mc:Choice>
-    <mc:Fallback>
+    <mc:Fallback xmlns="">
       <p:transition spd="slow">
         <p:fade/>
       </p:transition>
@@ -40826,7 +40761,7 @@
                   <a:schemeClr val="bg1"/>
                 </a:solidFill>
               </a:rPr>
-              <a:t>If the donation is valid, it will return a “register-success” page. Else, there would be an error page shown.</a:t>
+              <a:t>If the donation is valid, it will return a “register-success” page. Else, there would be a notification page shown.</a:t>
             </a:r>
             <a:endParaRPr lang="vi-VN" dirty="0">
               <a:solidFill>
@@ -40846,13 +40781,13 @@
   <p:clrMapOvr>
     <a:masterClrMapping/>
   </p:clrMapOvr>
-  <mc:AlternateContent xmlns:mc="http://schemas.openxmlformats.org/markup-compatibility/2006">
-    <mc:Choice xmlns:p159="http://schemas.microsoft.com/office/powerpoint/2015/09/main" Requires="p159">
+  <mc:AlternateContent xmlns:mc="http://schemas.openxmlformats.org/markup-compatibility/2006" xmlns:p159="http://schemas.microsoft.com/office/powerpoint/2015/09/main">
+    <mc:Choice Requires="p159">
       <p:transition xmlns:p14="http://schemas.microsoft.com/office/powerpoint/2010/main" spd="slow" p14:dur="2000">
         <p159:morph option="byObject"/>
       </p:transition>
     </mc:Choice>
-    <mc:Fallback>
+    <mc:Fallback xmlns="">
       <p:transition spd="slow">
         <p:fade/>
       </p:transition>

</xml_diff>